<commit_message>
Update DeveloperGuide.adoc and UML Diagrams
</commit_message>
<xml_diff>
--- a/docs/diagrams/HighLevelSequenceDiagrams.pptx
+++ b/docs/diagrams/HighLevelSequenceDiagrams.pptx
@@ -5,10 +5,11 @@
     <p:sldMasterId id="2147483648" r:id="rId1"/>
   </p:sldMasterIdLst>
   <p:notesMasterIdLst>
-    <p:notesMasterId r:id="rId3"/>
+    <p:notesMasterId r:id="rId4"/>
   </p:notesMasterIdLst>
   <p:sldIdLst>
     <p:sldId id="266" r:id="rId2"/>
+    <p:sldId id="267" r:id="rId3"/>
   </p:sldIdLst>
   <p:sldSz cx="9144000" cy="6858000" type="screen4x3"/>
   <p:notesSz cx="6858000" cy="9144000"/>
@@ -107,6 +108,22 @@
       </a:defRPr>
     </a:lvl9pPr>
   </p:defaultTextStyle>
+  <p:extLst>
+    <p:ext uri="{EFAFB233-063F-42B5-8137-9DF3F51BA10A}">
+      <p15:sldGuideLst xmlns:p15="http://schemas.microsoft.com/office/powerpoint/2012/main">
+        <p15:guide id="1" orient="horz" pos="1488">
+          <p15:clr>
+            <a:srgbClr val="A4A3A4"/>
+          </p15:clr>
+        </p15:guide>
+        <p15:guide id="2" pos="2880">
+          <p15:clr>
+            <a:srgbClr val="A4A3A4"/>
+          </p15:clr>
+        </p15:guide>
+      </p15:sldGuideLst>
+    </p:ext>
+  </p:extLst>
 </p:presentation>
 </file>
 
@@ -192,7 +209,7 @@
           <a:p>
             <a:fld id="{F5CC4B3F-88C1-4FFA-B1B6-F41C21DC6924}" type="datetimeFigureOut">
               <a:rPr lang="en-US" smtClean="0"/>
-              <a:t>10/16/2016</a:t>
+              <a:t>11/10/2018</a:t>
             </a:fld>
             <a:endParaRPr lang="en-US"/>
           </a:p>
@@ -641,7 +658,7 @@
           <a:p>
             <a:fld id="{78C97017-6FC3-485B-9764-EAC9E56C1D49}" type="datetimeFigureOut">
               <a:rPr lang="en-US" smtClean="0"/>
-              <a:t>10/16/2016</a:t>
+              <a:t>11/10/2018</a:t>
             </a:fld>
             <a:endParaRPr lang="en-US"/>
           </a:p>
@@ -811,7 +828,7 @@
           <a:p>
             <a:fld id="{78C97017-6FC3-485B-9764-EAC9E56C1D49}" type="datetimeFigureOut">
               <a:rPr lang="en-US" smtClean="0"/>
-              <a:t>10/16/2016</a:t>
+              <a:t>11/10/2018</a:t>
             </a:fld>
             <a:endParaRPr lang="en-US"/>
           </a:p>
@@ -991,7 +1008,7 @@
           <a:p>
             <a:fld id="{78C97017-6FC3-485B-9764-EAC9E56C1D49}" type="datetimeFigureOut">
               <a:rPr lang="en-US" smtClean="0"/>
-              <a:t>10/16/2016</a:t>
+              <a:t>11/10/2018</a:t>
             </a:fld>
             <a:endParaRPr lang="en-US"/>
           </a:p>
@@ -1161,7 +1178,7 @@
           <a:p>
             <a:fld id="{78C97017-6FC3-485B-9764-EAC9E56C1D49}" type="datetimeFigureOut">
               <a:rPr lang="en-US" smtClean="0"/>
-              <a:t>10/16/2016</a:t>
+              <a:t>11/10/2018</a:t>
             </a:fld>
             <a:endParaRPr lang="en-US"/>
           </a:p>
@@ -1407,7 +1424,7 @@
           <a:p>
             <a:fld id="{78C97017-6FC3-485B-9764-EAC9E56C1D49}" type="datetimeFigureOut">
               <a:rPr lang="en-US" smtClean="0"/>
-              <a:t>10/16/2016</a:t>
+              <a:t>11/10/2018</a:t>
             </a:fld>
             <a:endParaRPr lang="en-US"/>
           </a:p>
@@ -1695,7 +1712,7 @@
           <a:p>
             <a:fld id="{78C97017-6FC3-485B-9764-EAC9E56C1D49}" type="datetimeFigureOut">
               <a:rPr lang="en-US" smtClean="0"/>
-              <a:t>10/16/2016</a:t>
+              <a:t>11/10/2018</a:t>
             </a:fld>
             <a:endParaRPr lang="en-US"/>
           </a:p>
@@ -2117,7 +2134,7 @@
           <a:p>
             <a:fld id="{78C97017-6FC3-485B-9764-EAC9E56C1D49}" type="datetimeFigureOut">
               <a:rPr lang="en-US" smtClean="0"/>
-              <a:t>10/16/2016</a:t>
+              <a:t>11/10/2018</a:t>
             </a:fld>
             <a:endParaRPr lang="en-US"/>
           </a:p>
@@ -2235,7 +2252,7 @@
           <a:p>
             <a:fld id="{78C97017-6FC3-485B-9764-EAC9E56C1D49}" type="datetimeFigureOut">
               <a:rPr lang="en-US" smtClean="0"/>
-              <a:t>10/16/2016</a:t>
+              <a:t>11/10/2018</a:t>
             </a:fld>
             <a:endParaRPr lang="en-US"/>
           </a:p>
@@ -2330,7 +2347,7 @@
           <a:p>
             <a:fld id="{78C97017-6FC3-485B-9764-EAC9E56C1D49}" type="datetimeFigureOut">
               <a:rPr lang="en-US" smtClean="0"/>
-              <a:t>10/16/2016</a:t>
+              <a:t>11/10/2018</a:t>
             </a:fld>
             <a:endParaRPr lang="en-US"/>
           </a:p>
@@ -2607,7 +2624,7 @@
           <a:p>
             <a:fld id="{78C97017-6FC3-485B-9764-EAC9E56C1D49}" type="datetimeFigureOut">
               <a:rPr lang="en-US" smtClean="0"/>
-              <a:t>10/16/2016</a:t>
+              <a:t>11/10/2018</a:t>
             </a:fld>
             <a:endParaRPr lang="en-US"/>
           </a:p>
@@ -2860,7 +2877,7 @@
           <a:p>
             <a:fld id="{78C97017-6FC3-485B-9764-EAC9E56C1D49}" type="datetimeFigureOut">
               <a:rPr lang="en-US" smtClean="0"/>
-              <a:t>10/16/2016</a:t>
+              <a:t>11/10/2018</a:t>
             </a:fld>
             <a:endParaRPr lang="en-US"/>
           </a:p>
@@ -3073,7 +3090,7 @@
           <a:p>
             <a:fld id="{78C97017-6FC3-485B-9764-EAC9E56C1D49}" type="datetimeFigureOut">
               <a:rPr lang="en-US" smtClean="0"/>
-              <a:t>10/16/2016</a:t>
+              <a:t>11/10/2018</a:t>
             </a:fld>
             <a:endParaRPr lang="en-US"/>
           </a:p>
@@ -3456,7 +3473,7 @@
         </p:nvSpPr>
         <p:spPr>
           <a:xfrm>
-            <a:off x="1111860" y="607926"/>
+            <a:off x="1111860" y="2360526"/>
             <a:ext cx="1093635" cy="346760"/>
           </a:xfrm>
           <a:prstGeom prst="rect">
@@ -3515,7 +3532,7 @@
         </p:nvCxnSpPr>
         <p:spPr>
           <a:xfrm>
-            <a:off x="1658677" y="971597"/>
+            <a:off x="1658677" y="2724197"/>
             <a:ext cx="0" cy="1723059"/>
           </a:xfrm>
           <a:prstGeom prst="line">
@@ -3552,7 +3569,7 @@
         </p:nvSpPr>
         <p:spPr>
           <a:xfrm>
-            <a:off x="1586669" y="1322292"/>
+            <a:off x="1586669" y="3074892"/>
             <a:ext cx="152400" cy="1019910"/>
           </a:xfrm>
           <a:prstGeom prst="rect">
@@ -3603,7 +3620,7 @@
         </p:nvGrpSpPr>
         <p:grpSpPr>
           <a:xfrm>
-            <a:off x="152400" y="533400"/>
+            <a:off x="152400" y="2286000"/>
             <a:ext cx="324036" cy="573410"/>
             <a:chOff x="3239901" y="4149080"/>
             <a:chExt cx="648072" cy="1146820"/>
@@ -3820,7 +3837,7 @@
         </p:nvSpPr>
         <p:spPr>
           <a:xfrm>
-            <a:off x="3335583" y="611613"/>
+            <a:off x="3335583" y="2364213"/>
             <a:ext cx="1093635" cy="346760"/>
           </a:xfrm>
           <a:prstGeom prst="rect">
@@ -3879,7 +3896,7 @@
         </p:nvCxnSpPr>
         <p:spPr>
           <a:xfrm>
-            <a:off x="3882400" y="975284"/>
+            <a:off x="3882400" y="2727884"/>
             <a:ext cx="0" cy="1723059"/>
           </a:xfrm>
           <a:prstGeom prst="line">
@@ -3916,7 +3933,7 @@
         </p:nvSpPr>
         <p:spPr>
           <a:xfrm>
-            <a:off x="3810392" y="1433477"/>
+            <a:off x="3810392" y="3186077"/>
             <a:ext cx="144016" cy="832525"/>
           </a:xfrm>
           <a:prstGeom prst="rect">
@@ -3967,7 +3984,7 @@
         </p:nvSpPr>
         <p:spPr>
           <a:xfrm>
-            <a:off x="5316783" y="607926"/>
+            <a:off x="5316783" y="2360526"/>
             <a:ext cx="1093635" cy="346760"/>
           </a:xfrm>
           <a:prstGeom prst="rect">
@@ -4026,7 +4043,7 @@
         </p:nvCxnSpPr>
         <p:spPr>
           <a:xfrm>
-            <a:off x="5863600" y="971597"/>
+            <a:off x="5863600" y="2724197"/>
             <a:ext cx="0" cy="1723059"/>
           </a:xfrm>
           <a:prstGeom prst="line">
@@ -4063,7 +4080,7 @@
         </p:nvSpPr>
         <p:spPr>
           <a:xfrm>
-            <a:off x="5791592" y="1538408"/>
+            <a:off x="5791592" y="3291008"/>
             <a:ext cx="142006" cy="651394"/>
           </a:xfrm>
           <a:prstGeom prst="rect">
@@ -4114,7 +4131,7 @@
         </p:nvCxnSpPr>
         <p:spPr>
           <a:xfrm>
-            <a:off x="466818" y="1325979"/>
+            <a:off x="466818" y="3078579"/>
             <a:ext cx="1119851" cy="0"/>
           </a:xfrm>
           <a:prstGeom prst="straightConnector1">
@@ -4150,7 +4167,7 @@
         </p:nvSpPr>
         <p:spPr>
           <a:xfrm>
-            <a:off x="466818" y="1345880"/>
+            <a:off x="466818" y="3098480"/>
             <a:ext cx="860170" cy="215444"/>
           </a:xfrm>
           <a:prstGeom prst="rect">
@@ -4180,7 +4197,7 @@
         </p:nvCxnSpPr>
         <p:spPr>
           <a:xfrm>
-            <a:off x="1739069" y="1433478"/>
+            <a:off x="1739069" y="3186078"/>
             <a:ext cx="2071323" cy="0"/>
           </a:xfrm>
           <a:prstGeom prst="straightConnector1">
@@ -4216,7 +4233,7 @@
         </p:nvSpPr>
         <p:spPr>
           <a:xfrm>
-            <a:off x="2166172" y="1453379"/>
+            <a:off x="2166172" y="3205979"/>
             <a:ext cx="1424846" cy="215444"/>
           </a:xfrm>
           <a:prstGeom prst="rect">
@@ -4254,7 +4271,7 @@
         </p:nvCxnSpPr>
         <p:spPr>
           <a:xfrm>
-            <a:off x="3954408" y="1538409"/>
+            <a:off x="3954408" y="3291009"/>
             <a:ext cx="1837184" cy="0"/>
           </a:xfrm>
           <a:prstGeom prst="straightConnector1">
@@ -4290,7 +4307,7 @@
         </p:nvSpPr>
         <p:spPr>
           <a:xfrm>
-            <a:off x="4299772" y="1542583"/>
+            <a:off x="4299772" y="3295183"/>
             <a:ext cx="1424846" cy="215444"/>
           </a:xfrm>
           <a:prstGeom prst="rect">
@@ -4336,8 +4353,8 @@
         </p:nvSpPr>
         <p:spPr>
           <a:xfrm>
-            <a:off x="6074030" y="1687656"/>
-            <a:ext cx="2438400" cy="215444"/>
+            <a:off x="6074030" y="3226713"/>
+            <a:ext cx="2438400" cy="430887"/>
           </a:xfrm>
           <a:prstGeom prst="rect">
             <a:avLst/>
@@ -4358,17 +4375,19 @@
                   </a:schemeClr>
                 </a:solidFill>
               </a:rPr>
-              <a:t>post(</a:t>
-            </a:r>
-            <a:r>
-              <a:rPr lang="en-US" sz="1400" dirty="0" err="1" smtClean="0">
+              <a:t>indicateTutorHelperChanged(</a:t>
+            </a:r>
+          </a:p>
+          <a:p>
+            <a:r>
+              <a:rPr lang="en-US" sz="1400" dirty="0" smtClean="0">
                 <a:solidFill>
                   <a:schemeClr val="accent5">
                     <a:lumMod val="75000"/>
                   </a:schemeClr>
                 </a:solidFill>
               </a:rPr>
-              <a:t>AddressBookChangedEvent</a:t>
+              <a:t>TutorHelperChangedEvent</a:t>
             </a:r>
             <a:r>
               <a:rPr lang="en-US" sz="1400" dirty="0" smtClean="0">
@@ -4398,7 +4417,7 @@
         </p:nvCxnSpPr>
         <p:spPr>
           <a:xfrm>
-            <a:off x="3954408" y="2190681"/>
+            <a:off x="3954408" y="3943281"/>
             <a:ext cx="1837184" cy="0"/>
           </a:xfrm>
           <a:prstGeom prst="straightConnector1">
@@ -4436,7 +4455,7 @@
         </p:nvCxnSpPr>
         <p:spPr>
           <a:xfrm>
-            <a:off x="1739069" y="2266002"/>
+            <a:off x="1739069" y="4018602"/>
             <a:ext cx="2058118" cy="0"/>
           </a:xfrm>
           <a:prstGeom prst="straightConnector1">
@@ -4474,7 +4493,7 @@
         </p:nvCxnSpPr>
         <p:spPr>
           <a:xfrm>
-            <a:off x="390618" y="2342202"/>
+            <a:off x="390618" y="4094802"/>
             <a:ext cx="1196051" cy="0"/>
           </a:xfrm>
           <a:prstGeom prst="straightConnector1">
@@ -4512,7 +4531,7 @@
         </p:nvSpPr>
         <p:spPr>
           <a:xfrm>
-            <a:off x="7696200" y="591251"/>
+            <a:off x="7696200" y="2343851"/>
             <a:ext cx="1371600" cy="346760"/>
           </a:xfrm>
           <a:prstGeom prst="rect">
@@ -4583,7 +4602,7 @@
         </p:nvCxnSpPr>
         <p:spPr>
           <a:xfrm>
-            <a:off x="8616802" y="944305"/>
+            <a:off x="8616802" y="2696905"/>
             <a:ext cx="0" cy="1723059"/>
           </a:xfrm>
           <a:prstGeom prst="line">
@@ -4622,7 +4641,7 @@
         </p:nvSpPr>
         <p:spPr>
           <a:xfrm>
-            <a:off x="8544794" y="1961202"/>
+            <a:off x="8544794" y="3713802"/>
             <a:ext cx="142006" cy="176787"/>
           </a:xfrm>
           <a:prstGeom prst="rect">
@@ -4677,7 +4696,7 @@
         </p:nvCxnSpPr>
         <p:spPr>
           <a:xfrm>
-            <a:off x="5943992" y="1961202"/>
+            <a:off x="5943992" y="3713802"/>
             <a:ext cx="2568438" cy="0"/>
           </a:xfrm>
           <a:prstGeom prst="straightConnector1">
@@ -4713,7 +4732,7 @@
         </p:nvCxnSpPr>
         <p:spPr>
           <a:xfrm>
-            <a:off x="5943992" y="2137989"/>
+            <a:off x="5943992" y="3890589"/>
             <a:ext cx="2549946" cy="0"/>
           </a:xfrm>
           <a:prstGeom prst="straightConnector1">
@@ -4745,6 +4764,73 @@
           </a:fontRef>
         </p:style>
       </p:cxnSp>
+      <p:cxnSp>
+        <p:nvCxnSpPr>
+          <p:cNvPr id="85" name="Straight Connector 84"/>
+          <p:cNvCxnSpPr/>
+          <p:nvPr/>
+        </p:nvCxnSpPr>
+        <p:spPr>
+          <a:xfrm flipH="1">
+            <a:off x="314394" y="2852272"/>
+            <a:ext cx="24" cy="1598671"/>
+          </a:xfrm>
+          <a:prstGeom prst="line">
+            <a:avLst/>
+          </a:prstGeom>
+          <a:ln w="19050">
+            <a:solidFill>
+              <a:schemeClr val="tx1"/>
+            </a:solidFill>
+            <a:prstDash val="sysDash"/>
+          </a:ln>
+          <a:effectLst/>
+        </p:spPr>
+        <p:style>
+          <a:lnRef idx="1">
+            <a:schemeClr val="accent1"/>
+          </a:lnRef>
+          <a:fillRef idx="2">
+            <a:schemeClr val="accent1"/>
+          </a:fillRef>
+          <a:effectRef idx="1">
+            <a:schemeClr val="accent1"/>
+          </a:effectRef>
+          <a:fontRef idx="minor">
+            <a:schemeClr val="dk1"/>
+          </a:fontRef>
+        </p:style>
+      </p:cxnSp>
+    </p:spTree>
+    <p:extLst>
+      <p:ext uri="{BB962C8B-B14F-4D97-AF65-F5344CB8AC3E}">
+        <p14:creationId xmlns:p14="http://schemas.microsoft.com/office/powerpoint/2010/main" val="4023378879"/>
+      </p:ext>
+    </p:extLst>
+  </p:cSld>
+  <p:clrMapOvr>
+    <a:masterClrMapping/>
+  </p:clrMapOvr>
+</p:sld>
+</file>
+
+<file path=ppt/slides/slide2.xml><?xml version="1.0" encoding="utf-8"?>
+<p:sld xmlns:a="http://schemas.openxmlformats.org/drawingml/2006/main" xmlns:r="http://schemas.openxmlformats.org/officeDocument/2006/relationships" xmlns:p="http://schemas.openxmlformats.org/presentationml/2006/main">
+  <p:cSld>
+    <p:spTree>
+      <p:nvGrpSpPr>
+        <p:cNvPr id="1" name=""/>
+        <p:cNvGrpSpPr/>
+        <p:nvPr/>
+      </p:nvGrpSpPr>
+      <p:grpSpPr>
+        <a:xfrm>
+          <a:off x="0" y="0"/>
+          <a:ext cx="0" cy="0"/>
+          <a:chOff x="0" y="0"/>
+          <a:chExt cx="0" cy="0"/>
+        </a:xfrm>
+      </p:grpSpPr>
       <p:sp>
         <p:nvSpPr>
           <p:cNvPr id="53" name="Rectangle 62"/>
@@ -4753,7 +4839,7 @@
         </p:nvSpPr>
         <p:spPr>
           <a:xfrm>
-            <a:off x="7370178" y="4278322"/>
+            <a:off x="7370178" y="2286000"/>
             <a:ext cx="1093635" cy="346760"/>
           </a:xfrm>
           <a:prstGeom prst="rect">
@@ -4816,7 +4902,7 @@
         </p:nvCxnSpPr>
         <p:spPr>
           <a:xfrm>
-            <a:off x="7916995" y="4641993"/>
+            <a:off x="7916995" y="2649671"/>
             <a:ext cx="0" cy="1723059"/>
           </a:xfrm>
           <a:prstGeom prst="line">
@@ -4855,7 +4941,7 @@
         </p:nvSpPr>
         <p:spPr>
           <a:xfrm>
-            <a:off x="7844987" y="5335662"/>
+            <a:off x="7844987" y="3343340"/>
             <a:ext cx="124478" cy="287409"/>
           </a:xfrm>
           <a:prstGeom prst="rect">
@@ -4910,8 +4996,8 @@
         </p:nvSpPr>
         <p:spPr>
           <a:xfrm>
-            <a:off x="1810094" y="4797674"/>
-            <a:ext cx="2716635" cy="215444"/>
+            <a:off x="1855365" y="2682191"/>
+            <a:ext cx="2716635" cy="400110"/>
           </a:xfrm>
           <a:prstGeom prst="rect">
             <a:avLst/>
@@ -4925,27 +5011,29 @@
           <a:lstStyle/>
           <a:p>
             <a:r>
-              <a:rPr lang="en-US" sz="1400" dirty="0" smtClean="0">
+              <a:rPr lang="en-US" sz="1300" dirty="0" smtClean="0">
                 <a:solidFill>
                   <a:schemeClr val="accent5">
                     <a:lumMod val="75000"/>
                   </a:schemeClr>
                 </a:solidFill>
               </a:rPr>
-              <a:t>post(</a:t>
-            </a:r>
-            <a:r>
-              <a:rPr lang="en-US" sz="1400" dirty="0" err="1" smtClean="0">
+              <a:t>indicateTutorHelperChanged(</a:t>
+            </a:r>
+          </a:p>
+          <a:p>
+            <a:r>
+              <a:rPr lang="en-US" sz="1300" dirty="0" smtClean="0">
                 <a:solidFill>
                   <a:schemeClr val="accent5">
                     <a:lumMod val="75000"/>
                   </a:schemeClr>
                 </a:solidFill>
               </a:rPr>
-              <a:t>AddressBookChangedEvent</a:t>
-            </a:r>
-            <a:r>
-              <a:rPr lang="en-US" sz="1400" dirty="0" smtClean="0">
+              <a:t>TutorHelperChangedEvent</a:t>
+            </a:r>
+            <a:r>
+              <a:rPr lang="en-US" sz="1300" dirty="0" smtClean="0">
                 <a:solidFill>
                   <a:schemeClr val="accent5">
                     <a:lumMod val="75000"/>
@@ -4954,7 +5042,7 @@
               </a:rPr>
               <a:t>)</a:t>
             </a:r>
-            <a:endParaRPr lang="en-US" sz="1400" dirty="0">
+            <a:endParaRPr lang="en-US" sz="1300" dirty="0">
               <a:solidFill>
                 <a:schemeClr val="accent5">
                   <a:lumMod val="75000"/>
@@ -4972,7 +5060,7 @@
         </p:nvCxnSpPr>
         <p:spPr>
           <a:xfrm flipH="1">
-            <a:off x="4526729" y="5623071"/>
+            <a:off x="4526729" y="3630749"/>
             <a:ext cx="3383941" cy="0"/>
           </a:xfrm>
           <a:prstGeom prst="straightConnector1">
@@ -5012,7 +5100,7 @@
         </p:nvSpPr>
         <p:spPr>
           <a:xfrm>
-            <a:off x="3791146" y="4295233"/>
+            <a:off x="3791146" y="2302911"/>
             <a:ext cx="1371600" cy="346760"/>
           </a:xfrm>
           <a:prstGeom prst="rect">
@@ -5083,7 +5171,7 @@
         </p:nvCxnSpPr>
         <p:spPr>
           <a:xfrm>
-            <a:off x="4456731" y="4648287"/>
+            <a:off x="4456731" y="2655965"/>
             <a:ext cx="0" cy="1723059"/>
           </a:xfrm>
           <a:prstGeom prst="line">
@@ -5122,7 +5210,7 @@
         </p:nvSpPr>
         <p:spPr>
           <a:xfrm>
-            <a:off x="4384723" y="5071220"/>
+            <a:off x="4384723" y="3078898"/>
             <a:ext cx="142006" cy="1036757"/>
           </a:xfrm>
           <a:prstGeom prst="rect">
@@ -5177,7 +5265,7 @@
         </p:nvCxnSpPr>
         <p:spPr>
           <a:xfrm>
-            <a:off x="3078929" y="5071220"/>
+            <a:off x="3078929" y="3078898"/>
             <a:ext cx="1295400" cy="0"/>
           </a:xfrm>
           <a:prstGeom prst="straightConnector1">
@@ -5213,7 +5301,7 @@
         </p:nvCxnSpPr>
         <p:spPr>
           <a:xfrm>
-            <a:off x="2975642" y="6107977"/>
+            <a:off x="2975642" y="4115655"/>
             <a:ext cx="1448755" cy="0"/>
           </a:xfrm>
           <a:prstGeom prst="straightConnector1">
@@ -5253,7 +5341,7 @@
         </p:nvCxnSpPr>
         <p:spPr>
           <a:xfrm>
-            <a:off x="4526729" y="5341014"/>
+            <a:off x="4526729" y="3348692"/>
             <a:ext cx="3318258" cy="0"/>
           </a:xfrm>
           <a:prstGeom prst="straightConnector1">
@@ -5292,7 +5380,7 @@
         </p:nvSpPr>
         <p:spPr>
           <a:xfrm>
-            <a:off x="5036330" y="5065911"/>
+            <a:off x="5036330" y="3073589"/>
             <a:ext cx="2659870" cy="215444"/>
           </a:xfrm>
           <a:prstGeom prst="rect">
@@ -5314,7 +5402,7 @@
                   </a:schemeClr>
                 </a:solidFill>
               </a:rPr>
-              <a:t>handleAddresssBookChangedEvent</a:t>
+              <a:t>handleTutorHelperChangedEvent</a:t>
             </a:r>
             <a:r>
               <a:rPr lang="en-US" sz="1400" dirty="0" smtClean="0">
@@ -5336,23 +5424,82 @@
           </a:p>
         </p:txBody>
       </p:sp>
+      <p:sp>
+        <p:nvSpPr>
+          <p:cNvPr id="45" name="Rectangle 62"/>
+          <p:cNvSpPr/>
+          <p:nvPr/>
+        </p:nvSpPr>
+        <p:spPr>
+          <a:xfrm>
+            <a:off x="721634" y="2286000"/>
+            <a:ext cx="1093635" cy="346760"/>
+          </a:xfrm>
+          <a:prstGeom prst="rect">
+            <a:avLst/>
+          </a:prstGeom>
+          <a:solidFill>
+            <a:srgbClr val="00B050"/>
+          </a:solidFill>
+          <a:ln w="19050">
+            <a:solidFill>
+              <a:srgbClr val="00B050"/>
+            </a:solidFill>
+          </a:ln>
+          <a:effectLst/>
+        </p:spPr>
+        <p:style>
+          <a:lnRef idx="1">
+            <a:schemeClr val="accent2"/>
+          </a:lnRef>
+          <a:fillRef idx="2">
+            <a:schemeClr val="accent2"/>
+          </a:fillRef>
+          <a:effectRef idx="1">
+            <a:schemeClr val="accent2"/>
+          </a:effectRef>
+          <a:fontRef idx="minor">
+            <a:schemeClr val="dk1"/>
+          </a:fontRef>
+        </p:style>
+        <p:txBody>
+          <a:bodyPr rtlCol="0" anchor="ctr"/>
+          <a:lstStyle/>
+          <a:p>
+            <a:pPr algn="ctr"/>
+            <a:r>
+              <a:rPr lang="en-US" sz="1600" dirty="0" smtClean="0">
+                <a:solidFill>
+                  <a:schemeClr val="bg1"/>
+                </a:solidFill>
+              </a:rPr>
+              <a:t>:UI</a:t>
+            </a:r>
+            <a:endParaRPr lang="en-SG" sz="1600" dirty="0">
+              <a:solidFill>
+                <a:schemeClr val="bg1"/>
+              </a:solidFill>
+            </a:endParaRPr>
+          </a:p>
+        </p:txBody>
+      </p:sp>
       <p:cxnSp>
         <p:nvCxnSpPr>
-          <p:cNvPr id="85" name="Straight Connector 84"/>
+          <p:cNvPr id="46" name="Straight Connector 45"/>
           <p:cNvCxnSpPr/>
           <p:nvPr/>
         </p:nvCxnSpPr>
         <p:spPr>
-          <a:xfrm flipH="1">
-            <a:off x="314394" y="1099672"/>
-            <a:ext cx="24" cy="1598671"/>
+          <a:xfrm>
+            <a:off x="1268451" y="2649671"/>
+            <a:ext cx="0" cy="1723059"/>
           </a:xfrm>
           <a:prstGeom prst="line">
             <a:avLst/>
           </a:prstGeom>
           <a:ln w="19050">
             <a:solidFill>
-              <a:schemeClr val="tx1"/>
+              <a:srgbClr val="00B050"/>
             </a:solidFill>
             <a:prstDash val="sysDash"/>
           </a:ln>
@@ -5375,109 +5522,13 @@
       </p:cxnSp>
       <p:sp>
         <p:nvSpPr>
-          <p:cNvPr id="45" name="Rectangle 62"/>
-          <p:cNvSpPr/>
-          <p:nvPr/>
-        </p:nvSpPr>
-        <p:spPr>
-          <a:xfrm>
-            <a:off x="721634" y="4278322"/>
-            <a:ext cx="1093635" cy="346760"/>
-          </a:xfrm>
-          <a:prstGeom prst="rect">
-            <a:avLst/>
-          </a:prstGeom>
-          <a:solidFill>
-            <a:srgbClr val="00B050"/>
-          </a:solidFill>
-          <a:ln w="19050">
-            <a:solidFill>
-              <a:srgbClr val="00B050"/>
-            </a:solidFill>
-          </a:ln>
-          <a:effectLst/>
-        </p:spPr>
-        <p:style>
-          <a:lnRef idx="1">
-            <a:schemeClr val="accent2"/>
-          </a:lnRef>
-          <a:fillRef idx="2">
-            <a:schemeClr val="accent2"/>
-          </a:fillRef>
-          <a:effectRef idx="1">
-            <a:schemeClr val="accent2"/>
-          </a:effectRef>
-          <a:fontRef idx="minor">
-            <a:schemeClr val="dk1"/>
-          </a:fontRef>
-        </p:style>
-        <p:txBody>
-          <a:bodyPr rtlCol="0" anchor="ctr"/>
-          <a:lstStyle/>
-          <a:p>
-            <a:pPr algn="ctr"/>
-            <a:r>
-              <a:rPr lang="en-US" sz="1600" dirty="0" smtClean="0">
-                <a:solidFill>
-                  <a:schemeClr val="bg1"/>
-                </a:solidFill>
-              </a:rPr>
-              <a:t>:UI</a:t>
-            </a:r>
-            <a:endParaRPr lang="en-SG" sz="1600" dirty="0">
-              <a:solidFill>
-                <a:schemeClr val="bg1"/>
-              </a:solidFill>
-            </a:endParaRPr>
-          </a:p>
-        </p:txBody>
-      </p:sp>
-      <p:cxnSp>
-        <p:nvCxnSpPr>
-          <p:cNvPr id="46" name="Straight Connector 45"/>
-          <p:cNvCxnSpPr/>
-          <p:nvPr/>
-        </p:nvCxnSpPr>
-        <p:spPr>
-          <a:xfrm>
-            <a:off x="1268451" y="4641993"/>
-            <a:ext cx="0" cy="1723059"/>
-          </a:xfrm>
-          <a:prstGeom prst="line">
-            <a:avLst/>
-          </a:prstGeom>
-          <a:ln w="19050">
-            <a:solidFill>
-              <a:srgbClr val="00B050"/>
-            </a:solidFill>
-            <a:prstDash val="sysDash"/>
-          </a:ln>
-          <a:effectLst/>
-        </p:spPr>
-        <p:style>
-          <a:lnRef idx="1">
-            <a:schemeClr val="accent1"/>
-          </a:lnRef>
-          <a:fillRef idx="2">
-            <a:schemeClr val="accent1"/>
-          </a:fillRef>
-          <a:effectRef idx="1">
-            <a:schemeClr val="accent1"/>
-          </a:effectRef>
-          <a:fontRef idx="minor">
-            <a:schemeClr val="dk1"/>
-          </a:fontRef>
-        </p:style>
-      </p:cxnSp>
-      <p:sp>
-        <p:nvSpPr>
           <p:cNvPr id="47" name="Rectangle 46"/>
           <p:cNvSpPr/>
           <p:nvPr/>
         </p:nvSpPr>
         <p:spPr>
           <a:xfrm>
-            <a:off x="1196443" y="5670472"/>
+            <a:off x="1196443" y="3678150"/>
             <a:ext cx="130545" cy="273128"/>
           </a:xfrm>
           <a:prstGeom prst="rect">
@@ -5528,7 +5579,7 @@
         </p:nvCxnSpPr>
         <p:spPr>
           <a:xfrm flipH="1">
-            <a:off x="1348843" y="5943600"/>
+            <a:off x="1348843" y="3951278"/>
             <a:ext cx="3061842" cy="0"/>
           </a:xfrm>
           <a:prstGeom prst="straightConnector1">
@@ -5566,7 +5617,7 @@
         </p:nvCxnSpPr>
         <p:spPr>
           <a:xfrm>
-            <a:off x="1348843" y="5670472"/>
+            <a:off x="1348843" y="3678150"/>
             <a:ext cx="3061841" cy="0"/>
           </a:xfrm>
           <a:prstGeom prst="straightConnector1">
@@ -5605,7 +5656,7 @@
         </p:nvSpPr>
         <p:spPr>
           <a:xfrm>
-            <a:off x="1416276" y="5395369"/>
+            <a:off x="1416276" y="3403047"/>
             <a:ext cx="2659870" cy="215444"/>
           </a:xfrm>
           <a:prstGeom prst="rect">
@@ -5625,7 +5676,7 @@
                   <a:srgbClr val="00B050"/>
                 </a:solidFill>
               </a:rPr>
-              <a:t>handleAddresssBookChangedEvent</a:t>
+              <a:t>handleTutorHelperChangedEvent</a:t>
             </a:r>
             <a:r>
               <a:rPr lang="en-US" sz="1400" dirty="0" smtClean="0">
@@ -5651,7 +5702,7 @@
         </p:nvGrpSpPr>
         <p:grpSpPr>
           <a:xfrm>
-            <a:off x="1028134" y="5612032"/>
+            <a:off x="1028134" y="3619710"/>
             <a:ext cx="217349" cy="270072"/>
             <a:chOff x="1028134" y="5612032"/>
             <a:chExt cx="217349" cy="270072"/>
@@ -5810,7 +5861,7 @@
         </p:nvSpPr>
         <p:spPr>
           <a:xfrm>
-            <a:off x="194562" y="5444571"/>
+            <a:off x="194562" y="3452249"/>
             <a:ext cx="794081" cy="430887"/>
           </a:xfrm>
           <a:prstGeom prst="rect">
@@ -5849,7 +5900,7 @@
         </p:nvGrpSpPr>
         <p:grpSpPr>
           <a:xfrm flipH="1">
-            <a:off x="7936842" y="5335662"/>
+            <a:off x="7936842" y="3343340"/>
             <a:ext cx="217349" cy="270072"/>
             <a:chOff x="1028134" y="5612032"/>
             <a:chExt cx="217349" cy="270072"/>
@@ -6012,7 +6063,7 @@
         </p:nvSpPr>
         <p:spPr>
           <a:xfrm>
-            <a:off x="8223953" y="5180992"/>
+            <a:off x="8223953" y="3188670"/>
             <a:ext cx="539047" cy="430887"/>
           </a:xfrm>
           <a:prstGeom prst="rect">
@@ -6068,7 +6119,7 @@
     </p:spTree>
     <p:extLst>
       <p:ext uri="{BB962C8B-B14F-4D97-AF65-F5344CB8AC3E}">
-        <p14:creationId xmlns:p14="http://schemas.microsoft.com/office/powerpoint/2010/main" val="4023378879"/>
+        <p14:creationId xmlns:p14="http://schemas.microsoft.com/office/powerpoint/2010/main" val="4294925931"/>
       </p:ext>
     </p:extLst>
   </p:cSld>

</xml_diff>

<commit_message>
Auto stash before revert of "Revert "Update changes (#35)""
</commit_message>
<xml_diff>
--- a/docs/diagrams/HighLevelSequenceDiagrams.pptx
+++ b/docs/diagrams/HighLevelSequenceDiagrams.pptx
@@ -5,11 +5,10 @@
     <p:sldMasterId id="2147483648" r:id="rId1"/>
   </p:sldMasterIdLst>
   <p:notesMasterIdLst>
-    <p:notesMasterId r:id="rId4"/>
+    <p:notesMasterId r:id="rId3"/>
   </p:notesMasterIdLst>
   <p:sldIdLst>
     <p:sldId id="266" r:id="rId2"/>
-    <p:sldId id="267" r:id="rId3"/>
   </p:sldIdLst>
   <p:sldSz cx="9144000" cy="6858000" type="screen4x3"/>
   <p:notesSz cx="6858000" cy="9144000"/>
@@ -108,22 +107,6 @@
       </a:defRPr>
     </a:lvl9pPr>
   </p:defaultTextStyle>
-  <p:extLst>
-    <p:ext uri="{EFAFB233-063F-42B5-8137-9DF3F51BA10A}">
-      <p15:sldGuideLst xmlns:p15="http://schemas.microsoft.com/office/powerpoint/2012/main">
-        <p15:guide id="1" orient="horz" pos="1488">
-          <p15:clr>
-            <a:srgbClr val="A4A3A4"/>
-          </p15:clr>
-        </p15:guide>
-        <p15:guide id="2" pos="2880">
-          <p15:clr>
-            <a:srgbClr val="A4A3A4"/>
-          </p15:clr>
-        </p15:guide>
-      </p15:sldGuideLst>
-    </p:ext>
-  </p:extLst>
 </p:presentation>
 </file>
 
@@ -209,7 +192,7 @@
           <a:p>
             <a:fld id="{F5CC4B3F-88C1-4FFA-B1B6-F41C21DC6924}" type="datetimeFigureOut">
               <a:rPr lang="en-US" smtClean="0"/>
-              <a:t>11/10/2018</a:t>
+              <a:t>10/16/2016</a:t>
             </a:fld>
             <a:endParaRPr lang="en-US"/>
           </a:p>
@@ -658,7 +641,7 @@
           <a:p>
             <a:fld id="{78C97017-6FC3-485B-9764-EAC9E56C1D49}" type="datetimeFigureOut">
               <a:rPr lang="en-US" smtClean="0"/>
-              <a:t>11/10/2018</a:t>
+              <a:t>10/16/2016</a:t>
             </a:fld>
             <a:endParaRPr lang="en-US"/>
           </a:p>
@@ -828,7 +811,7 @@
           <a:p>
             <a:fld id="{78C97017-6FC3-485B-9764-EAC9E56C1D49}" type="datetimeFigureOut">
               <a:rPr lang="en-US" smtClean="0"/>
-              <a:t>11/10/2018</a:t>
+              <a:t>10/16/2016</a:t>
             </a:fld>
             <a:endParaRPr lang="en-US"/>
           </a:p>
@@ -1008,7 +991,7 @@
           <a:p>
             <a:fld id="{78C97017-6FC3-485B-9764-EAC9E56C1D49}" type="datetimeFigureOut">
               <a:rPr lang="en-US" smtClean="0"/>
-              <a:t>11/10/2018</a:t>
+              <a:t>10/16/2016</a:t>
             </a:fld>
             <a:endParaRPr lang="en-US"/>
           </a:p>
@@ -1178,7 +1161,7 @@
           <a:p>
             <a:fld id="{78C97017-6FC3-485B-9764-EAC9E56C1D49}" type="datetimeFigureOut">
               <a:rPr lang="en-US" smtClean="0"/>
-              <a:t>11/10/2018</a:t>
+              <a:t>10/16/2016</a:t>
             </a:fld>
             <a:endParaRPr lang="en-US"/>
           </a:p>
@@ -1424,7 +1407,7 @@
           <a:p>
             <a:fld id="{78C97017-6FC3-485B-9764-EAC9E56C1D49}" type="datetimeFigureOut">
               <a:rPr lang="en-US" smtClean="0"/>
-              <a:t>11/10/2018</a:t>
+              <a:t>10/16/2016</a:t>
             </a:fld>
             <a:endParaRPr lang="en-US"/>
           </a:p>
@@ -1712,7 +1695,7 @@
           <a:p>
             <a:fld id="{78C97017-6FC3-485B-9764-EAC9E56C1D49}" type="datetimeFigureOut">
               <a:rPr lang="en-US" smtClean="0"/>
-              <a:t>11/10/2018</a:t>
+              <a:t>10/16/2016</a:t>
             </a:fld>
             <a:endParaRPr lang="en-US"/>
           </a:p>
@@ -2134,7 +2117,7 @@
           <a:p>
             <a:fld id="{78C97017-6FC3-485B-9764-EAC9E56C1D49}" type="datetimeFigureOut">
               <a:rPr lang="en-US" smtClean="0"/>
-              <a:t>11/10/2018</a:t>
+              <a:t>10/16/2016</a:t>
             </a:fld>
             <a:endParaRPr lang="en-US"/>
           </a:p>
@@ -2252,7 +2235,7 @@
           <a:p>
             <a:fld id="{78C97017-6FC3-485B-9764-EAC9E56C1D49}" type="datetimeFigureOut">
               <a:rPr lang="en-US" smtClean="0"/>
-              <a:t>11/10/2018</a:t>
+              <a:t>10/16/2016</a:t>
             </a:fld>
             <a:endParaRPr lang="en-US"/>
           </a:p>
@@ -2347,7 +2330,7 @@
           <a:p>
             <a:fld id="{78C97017-6FC3-485B-9764-EAC9E56C1D49}" type="datetimeFigureOut">
               <a:rPr lang="en-US" smtClean="0"/>
-              <a:t>11/10/2018</a:t>
+              <a:t>10/16/2016</a:t>
             </a:fld>
             <a:endParaRPr lang="en-US"/>
           </a:p>
@@ -2624,7 +2607,7 @@
           <a:p>
             <a:fld id="{78C97017-6FC3-485B-9764-EAC9E56C1D49}" type="datetimeFigureOut">
               <a:rPr lang="en-US" smtClean="0"/>
-              <a:t>11/10/2018</a:t>
+              <a:t>10/16/2016</a:t>
             </a:fld>
             <a:endParaRPr lang="en-US"/>
           </a:p>
@@ -2877,7 +2860,7 @@
           <a:p>
             <a:fld id="{78C97017-6FC3-485B-9764-EAC9E56C1D49}" type="datetimeFigureOut">
               <a:rPr lang="en-US" smtClean="0"/>
-              <a:t>11/10/2018</a:t>
+              <a:t>10/16/2016</a:t>
             </a:fld>
             <a:endParaRPr lang="en-US"/>
           </a:p>
@@ -3090,7 +3073,7 @@
           <a:p>
             <a:fld id="{78C97017-6FC3-485B-9764-EAC9E56C1D49}" type="datetimeFigureOut">
               <a:rPr lang="en-US" smtClean="0"/>
-              <a:t>11/10/2018</a:t>
+              <a:t>10/16/2016</a:t>
             </a:fld>
             <a:endParaRPr lang="en-US"/>
           </a:p>
@@ -3473,7 +3456,7 @@
         </p:nvSpPr>
         <p:spPr>
           <a:xfrm>
-            <a:off x="1111860" y="2360526"/>
+            <a:off x="1111860" y="607926"/>
             <a:ext cx="1093635" cy="346760"/>
           </a:xfrm>
           <a:prstGeom prst="rect">
@@ -3532,7 +3515,7 @@
         </p:nvCxnSpPr>
         <p:spPr>
           <a:xfrm>
-            <a:off x="1658677" y="2724197"/>
+            <a:off x="1658677" y="971597"/>
             <a:ext cx="0" cy="1723059"/>
           </a:xfrm>
           <a:prstGeom prst="line">
@@ -3569,7 +3552,7 @@
         </p:nvSpPr>
         <p:spPr>
           <a:xfrm>
-            <a:off x="1586669" y="3074892"/>
+            <a:off x="1586669" y="1322292"/>
             <a:ext cx="152400" cy="1019910"/>
           </a:xfrm>
           <a:prstGeom prst="rect">
@@ -3620,7 +3603,7 @@
         </p:nvGrpSpPr>
         <p:grpSpPr>
           <a:xfrm>
-            <a:off x="152400" y="2286000"/>
+            <a:off x="152400" y="533400"/>
             <a:ext cx="324036" cy="573410"/>
             <a:chOff x="3239901" y="4149080"/>
             <a:chExt cx="648072" cy="1146820"/>
@@ -3837,7 +3820,7 @@
         </p:nvSpPr>
         <p:spPr>
           <a:xfrm>
-            <a:off x="3335583" y="2364213"/>
+            <a:off x="3335583" y="611613"/>
             <a:ext cx="1093635" cy="346760"/>
           </a:xfrm>
           <a:prstGeom prst="rect">
@@ -3896,7 +3879,7 @@
         </p:nvCxnSpPr>
         <p:spPr>
           <a:xfrm>
-            <a:off x="3882400" y="2727884"/>
+            <a:off x="3882400" y="975284"/>
             <a:ext cx="0" cy="1723059"/>
           </a:xfrm>
           <a:prstGeom prst="line">
@@ -3933,7 +3916,7 @@
         </p:nvSpPr>
         <p:spPr>
           <a:xfrm>
-            <a:off x="3810392" y="3186077"/>
+            <a:off x="3810392" y="1433477"/>
             <a:ext cx="144016" cy="832525"/>
           </a:xfrm>
           <a:prstGeom prst="rect">
@@ -3984,7 +3967,7 @@
         </p:nvSpPr>
         <p:spPr>
           <a:xfrm>
-            <a:off x="5316783" y="2360526"/>
+            <a:off x="5316783" y="607926"/>
             <a:ext cx="1093635" cy="346760"/>
           </a:xfrm>
           <a:prstGeom prst="rect">
@@ -4043,7 +4026,7 @@
         </p:nvCxnSpPr>
         <p:spPr>
           <a:xfrm>
-            <a:off x="5863600" y="2724197"/>
+            <a:off x="5863600" y="971597"/>
             <a:ext cx="0" cy="1723059"/>
           </a:xfrm>
           <a:prstGeom prst="line">
@@ -4080,7 +4063,7 @@
         </p:nvSpPr>
         <p:spPr>
           <a:xfrm>
-            <a:off x="5791592" y="3291008"/>
+            <a:off x="5791592" y="1538408"/>
             <a:ext cx="142006" cy="651394"/>
           </a:xfrm>
           <a:prstGeom prst="rect">
@@ -4131,7 +4114,7 @@
         </p:nvCxnSpPr>
         <p:spPr>
           <a:xfrm>
-            <a:off x="466818" y="3078579"/>
+            <a:off x="466818" y="1325979"/>
             <a:ext cx="1119851" cy="0"/>
           </a:xfrm>
           <a:prstGeom prst="straightConnector1">
@@ -4167,7 +4150,7 @@
         </p:nvSpPr>
         <p:spPr>
           <a:xfrm>
-            <a:off x="466818" y="3098480"/>
+            <a:off x="466818" y="1345880"/>
             <a:ext cx="860170" cy="215444"/>
           </a:xfrm>
           <a:prstGeom prst="rect">
@@ -4197,7 +4180,7 @@
         </p:nvCxnSpPr>
         <p:spPr>
           <a:xfrm>
-            <a:off x="1739069" y="3186078"/>
+            <a:off x="1739069" y="1433478"/>
             <a:ext cx="2071323" cy="0"/>
           </a:xfrm>
           <a:prstGeom prst="straightConnector1">
@@ -4233,7 +4216,7 @@
         </p:nvSpPr>
         <p:spPr>
           <a:xfrm>
-            <a:off x="2166172" y="3205979"/>
+            <a:off x="2166172" y="1453379"/>
             <a:ext cx="1424846" cy="215444"/>
           </a:xfrm>
           <a:prstGeom prst="rect">
@@ -4271,7 +4254,7 @@
         </p:nvCxnSpPr>
         <p:spPr>
           <a:xfrm>
-            <a:off x="3954408" y="3291009"/>
+            <a:off x="3954408" y="1538409"/>
             <a:ext cx="1837184" cy="0"/>
           </a:xfrm>
           <a:prstGeom prst="straightConnector1">
@@ -4307,7 +4290,7 @@
         </p:nvSpPr>
         <p:spPr>
           <a:xfrm>
-            <a:off x="4299772" y="3295183"/>
+            <a:off x="4299772" y="1542583"/>
             <a:ext cx="1424846" cy="215444"/>
           </a:xfrm>
           <a:prstGeom prst="rect">
@@ -4353,8 +4336,8 @@
         </p:nvSpPr>
         <p:spPr>
           <a:xfrm>
-            <a:off x="6074030" y="3226713"/>
-            <a:ext cx="2438400" cy="430887"/>
+            <a:off x="6074030" y="1687656"/>
+            <a:ext cx="2438400" cy="215444"/>
           </a:xfrm>
           <a:prstGeom prst="rect">
             <a:avLst/>
@@ -4375,19 +4358,17 @@
                   </a:schemeClr>
                 </a:solidFill>
               </a:rPr>
-              <a:t>indicateTutorHelperChanged(</a:t>
-            </a:r>
-          </a:p>
-          <a:p>
-            <a:r>
-              <a:rPr lang="en-US" sz="1400" dirty="0" smtClean="0">
+              <a:t>post(</a:t>
+            </a:r>
+            <a:r>
+              <a:rPr lang="en-US" sz="1400" dirty="0" err="1" smtClean="0">
                 <a:solidFill>
                   <a:schemeClr val="accent5">
                     <a:lumMod val="75000"/>
                   </a:schemeClr>
                 </a:solidFill>
               </a:rPr>
-              <a:t>TutorHelperChangedEvent</a:t>
+              <a:t>AddressBookChangedEvent</a:t>
             </a:r>
             <a:r>
               <a:rPr lang="en-US" sz="1400" dirty="0" smtClean="0">
@@ -4417,7 +4398,7 @@
         </p:nvCxnSpPr>
         <p:spPr>
           <a:xfrm>
-            <a:off x="3954408" y="3943281"/>
+            <a:off x="3954408" y="2190681"/>
             <a:ext cx="1837184" cy="0"/>
           </a:xfrm>
           <a:prstGeom prst="straightConnector1">
@@ -4455,7 +4436,7 @@
         </p:nvCxnSpPr>
         <p:spPr>
           <a:xfrm>
-            <a:off x="1739069" y="4018602"/>
+            <a:off x="1739069" y="2266002"/>
             <a:ext cx="2058118" cy="0"/>
           </a:xfrm>
           <a:prstGeom prst="straightConnector1">
@@ -4493,7 +4474,7 @@
         </p:nvCxnSpPr>
         <p:spPr>
           <a:xfrm>
-            <a:off x="390618" y="4094802"/>
+            <a:off x="390618" y="2342202"/>
             <a:ext cx="1196051" cy="0"/>
           </a:xfrm>
           <a:prstGeom prst="straightConnector1">
@@ -4531,7 +4512,7 @@
         </p:nvSpPr>
         <p:spPr>
           <a:xfrm>
-            <a:off x="7696200" y="2343851"/>
+            <a:off x="7696200" y="591251"/>
             <a:ext cx="1371600" cy="346760"/>
           </a:xfrm>
           <a:prstGeom prst="rect">
@@ -4602,7 +4583,7 @@
         </p:nvCxnSpPr>
         <p:spPr>
           <a:xfrm>
-            <a:off x="8616802" y="2696905"/>
+            <a:off x="8616802" y="944305"/>
             <a:ext cx="0" cy="1723059"/>
           </a:xfrm>
           <a:prstGeom prst="line">
@@ -4641,7 +4622,7 @@
         </p:nvSpPr>
         <p:spPr>
           <a:xfrm>
-            <a:off x="8544794" y="3713802"/>
+            <a:off x="8544794" y="1961202"/>
             <a:ext cx="142006" cy="176787"/>
           </a:xfrm>
           <a:prstGeom prst="rect">
@@ -4696,7 +4677,7 @@
         </p:nvCxnSpPr>
         <p:spPr>
           <a:xfrm>
-            <a:off x="5943992" y="3713802"/>
+            <a:off x="5943992" y="1961202"/>
             <a:ext cx="2568438" cy="0"/>
           </a:xfrm>
           <a:prstGeom prst="straightConnector1">
@@ -4732,7 +4713,7 @@
         </p:nvCxnSpPr>
         <p:spPr>
           <a:xfrm>
-            <a:off x="5943992" y="3890589"/>
+            <a:off x="5943992" y="2137989"/>
             <a:ext cx="2549946" cy="0"/>
           </a:xfrm>
           <a:prstGeom prst="straightConnector1">
@@ -4764,73 +4745,6 @@
           </a:fontRef>
         </p:style>
       </p:cxnSp>
-      <p:cxnSp>
-        <p:nvCxnSpPr>
-          <p:cNvPr id="85" name="Straight Connector 84"/>
-          <p:cNvCxnSpPr/>
-          <p:nvPr/>
-        </p:nvCxnSpPr>
-        <p:spPr>
-          <a:xfrm flipH="1">
-            <a:off x="314394" y="2852272"/>
-            <a:ext cx="24" cy="1598671"/>
-          </a:xfrm>
-          <a:prstGeom prst="line">
-            <a:avLst/>
-          </a:prstGeom>
-          <a:ln w="19050">
-            <a:solidFill>
-              <a:schemeClr val="tx1"/>
-            </a:solidFill>
-            <a:prstDash val="sysDash"/>
-          </a:ln>
-          <a:effectLst/>
-        </p:spPr>
-        <p:style>
-          <a:lnRef idx="1">
-            <a:schemeClr val="accent1"/>
-          </a:lnRef>
-          <a:fillRef idx="2">
-            <a:schemeClr val="accent1"/>
-          </a:fillRef>
-          <a:effectRef idx="1">
-            <a:schemeClr val="accent1"/>
-          </a:effectRef>
-          <a:fontRef idx="minor">
-            <a:schemeClr val="dk1"/>
-          </a:fontRef>
-        </p:style>
-      </p:cxnSp>
-    </p:spTree>
-    <p:extLst>
-      <p:ext uri="{BB962C8B-B14F-4D97-AF65-F5344CB8AC3E}">
-        <p14:creationId xmlns:p14="http://schemas.microsoft.com/office/powerpoint/2010/main" val="4023378879"/>
-      </p:ext>
-    </p:extLst>
-  </p:cSld>
-  <p:clrMapOvr>
-    <a:masterClrMapping/>
-  </p:clrMapOvr>
-</p:sld>
-</file>
-
-<file path=ppt/slides/slide2.xml><?xml version="1.0" encoding="utf-8"?>
-<p:sld xmlns:a="http://schemas.openxmlformats.org/drawingml/2006/main" xmlns:r="http://schemas.openxmlformats.org/officeDocument/2006/relationships" xmlns:p="http://schemas.openxmlformats.org/presentationml/2006/main">
-  <p:cSld>
-    <p:spTree>
-      <p:nvGrpSpPr>
-        <p:cNvPr id="1" name=""/>
-        <p:cNvGrpSpPr/>
-        <p:nvPr/>
-      </p:nvGrpSpPr>
-      <p:grpSpPr>
-        <a:xfrm>
-          <a:off x="0" y="0"/>
-          <a:ext cx="0" cy="0"/>
-          <a:chOff x="0" y="0"/>
-          <a:chExt cx="0" cy="0"/>
-        </a:xfrm>
-      </p:grpSpPr>
       <p:sp>
         <p:nvSpPr>
           <p:cNvPr id="53" name="Rectangle 62"/>
@@ -4839,7 +4753,7 @@
         </p:nvSpPr>
         <p:spPr>
           <a:xfrm>
-            <a:off x="7370178" y="2286000"/>
+            <a:off x="7370178" y="4278322"/>
             <a:ext cx="1093635" cy="346760"/>
           </a:xfrm>
           <a:prstGeom prst="rect">
@@ -4902,7 +4816,7 @@
         </p:nvCxnSpPr>
         <p:spPr>
           <a:xfrm>
-            <a:off x="7916995" y="2649671"/>
+            <a:off x="7916995" y="4641993"/>
             <a:ext cx="0" cy="1723059"/>
           </a:xfrm>
           <a:prstGeom prst="line">
@@ -4941,7 +4855,7 @@
         </p:nvSpPr>
         <p:spPr>
           <a:xfrm>
-            <a:off x="7844987" y="3343340"/>
+            <a:off x="7844987" y="5335662"/>
             <a:ext cx="124478" cy="287409"/>
           </a:xfrm>
           <a:prstGeom prst="rect">
@@ -4996,8 +4910,8 @@
         </p:nvSpPr>
         <p:spPr>
           <a:xfrm>
-            <a:off x="1855365" y="2682191"/>
-            <a:ext cx="2716635" cy="400110"/>
+            <a:off x="1810094" y="4797674"/>
+            <a:ext cx="2716635" cy="215444"/>
           </a:xfrm>
           <a:prstGeom prst="rect">
             <a:avLst/>
@@ -5011,29 +4925,27 @@
           <a:lstStyle/>
           <a:p>
             <a:r>
-              <a:rPr lang="en-US" sz="1300" dirty="0" smtClean="0">
+              <a:rPr lang="en-US" sz="1400" dirty="0" smtClean="0">
                 <a:solidFill>
                   <a:schemeClr val="accent5">
                     <a:lumMod val="75000"/>
                   </a:schemeClr>
                 </a:solidFill>
               </a:rPr>
-              <a:t>indicateTutorHelperChanged(</a:t>
-            </a:r>
-          </a:p>
-          <a:p>
-            <a:r>
-              <a:rPr lang="en-US" sz="1300" dirty="0" smtClean="0">
+              <a:t>post(</a:t>
+            </a:r>
+            <a:r>
+              <a:rPr lang="en-US" sz="1400" dirty="0" err="1" smtClean="0">
                 <a:solidFill>
                   <a:schemeClr val="accent5">
                     <a:lumMod val="75000"/>
                   </a:schemeClr>
                 </a:solidFill>
               </a:rPr>
-              <a:t>TutorHelperChangedEvent</a:t>
-            </a:r>
-            <a:r>
-              <a:rPr lang="en-US" sz="1300" dirty="0" smtClean="0">
+              <a:t>AddressBookChangedEvent</a:t>
+            </a:r>
+            <a:r>
+              <a:rPr lang="en-US" sz="1400" dirty="0" smtClean="0">
                 <a:solidFill>
                   <a:schemeClr val="accent5">
                     <a:lumMod val="75000"/>
@@ -5042,7 +4954,7 @@
               </a:rPr>
               <a:t>)</a:t>
             </a:r>
-            <a:endParaRPr lang="en-US" sz="1300" dirty="0">
+            <a:endParaRPr lang="en-US" sz="1400" dirty="0">
               <a:solidFill>
                 <a:schemeClr val="accent5">
                   <a:lumMod val="75000"/>
@@ -5060,7 +4972,7 @@
         </p:nvCxnSpPr>
         <p:spPr>
           <a:xfrm flipH="1">
-            <a:off x="4526729" y="3630749"/>
+            <a:off x="4526729" y="5623071"/>
             <a:ext cx="3383941" cy="0"/>
           </a:xfrm>
           <a:prstGeom prst="straightConnector1">
@@ -5100,7 +5012,7 @@
         </p:nvSpPr>
         <p:spPr>
           <a:xfrm>
-            <a:off x="3791146" y="2302911"/>
+            <a:off x="3791146" y="4295233"/>
             <a:ext cx="1371600" cy="346760"/>
           </a:xfrm>
           <a:prstGeom prst="rect">
@@ -5171,7 +5083,7 @@
         </p:nvCxnSpPr>
         <p:spPr>
           <a:xfrm>
-            <a:off x="4456731" y="2655965"/>
+            <a:off x="4456731" y="4648287"/>
             <a:ext cx="0" cy="1723059"/>
           </a:xfrm>
           <a:prstGeom prst="line">
@@ -5210,7 +5122,7 @@
         </p:nvSpPr>
         <p:spPr>
           <a:xfrm>
-            <a:off x="4384723" y="3078898"/>
+            <a:off x="4384723" y="5071220"/>
             <a:ext cx="142006" cy="1036757"/>
           </a:xfrm>
           <a:prstGeom prst="rect">
@@ -5265,7 +5177,7 @@
         </p:nvCxnSpPr>
         <p:spPr>
           <a:xfrm>
-            <a:off x="3078929" y="3078898"/>
+            <a:off x="3078929" y="5071220"/>
             <a:ext cx="1295400" cy="0"/>
           </a:xfrm>
           <a:prstGeom prst="straightConnector1">
@@ -5301,7 +5213,7 @@
         </p:nvCxnSpPr>
         <p:spPr>
           <a:xfrm>
-            <a:off x="2975642" y="4115655"/>
+            <a:off x="2975642" y="6107977"/>
             <a:ext cx="1448755" cy="0"/>
           </a:xfrm>
           <a:prstGeom prst="straightConnector1">
@@ -5341,7 +5253,7 @@
         </p:nvCxnSpPr>
         <p:spPr>
           <a:xfrm>
-            <a:off x="4526729" y="3348692"/>
+            <a:off x="4526729" y="5341014"/>
             <a:ext cx="3318258" cy="0"/>
           </a:xfrm>
           <a:prstGeom prst="straightConnector1">
@@ -5380,7 +5292,7 @@
         </p:nvSpPr>
         <p:spPr>
           <a:xfrm>
-            <a:off x="5036330" y="3073589"/>
+            <a:off x="5036330" y="5065911"/>
             <a:ext cx="2659870" cy="215444"/>
           </a:xfrm>
           <a:prstGeom prst="rect">
@@ -5402,7 +5314,7 @@
                   </a:schemeClr>
                 </a:solidFill>
               </a:rPr>
-              <a:t>handleTutorHelperChangedEvent</a:t>
+              <a:t>handleAddresssBookChangedEvent</a:t>
             </a:r>
             <a:r>
               <a:rPr lang="en-US" sz="1400" dirty="0" smtClean="0">
@@ -5424,82 +5336,23 @@
           </a:p>
         </p:txBody>
       </p:sp>
-      <p:sp>
-        <p:nvSpPr>
-          <p:cNvPr id="45" name="Rectangle 62"/>
-          <p:cNvSpPr/>
-          <p:nvPr/>
-        </p:nvSpPr>
-        <p:spPr>
-          <a:xfrm>
-            <a:off x="721634" y="2286000"/>
-            <a:ext cx="1093635" cy="346760"/>
-          </a:xfrm>
-          <a:prstGeom prst="rect">
-            <a:avLst/>
-          </a:prstGeom>
-          <a:solidFill>
-            <a:srgbClr val="00B050"/>
-          </a:solidFill>
-          <a:ln w="19050">
-            <a:solidFill>
-              <a:srgbClr val="00B050"/>
-            </a:solidFill>
-          </a:ln>
-          <a:effectLst/>
-        </p:spPr>
-        <p:style>
-          <a:lnRef idx="1">
-            <a:schemeClr val="accent2"/>
-          </a:lnRef>
-          <a:fillRef idx="2">
-            <a:schemeClr val="accent2"/>
-          </a:fillRef>
-          <a:effectRef idx="1">
-            <a:schemeClr val="accent2"/>
-          </a:effectRef>
-          <a:fontRef idx="minor">
-            <a:schemeClr val="dk1"/>
-          </a:fontRef>
-        </p:style>
-        <p:txBody>
-          <a:bodyPr rtlCol="0" anchor="ctr"/>
-          <a:lstStyle/>
-          <a:p>
-            <a:pPr algn="ctr"/>
-            <a:r>
-              <a:rPr lang="en-US" sz="1600" dirty="0" smtClean="0">
-                <a:solidFill>
-                  <a:schemeClr val="bg1"/>
-                </a:solidFill>
-              </a:rPr>
-              <a:t>:UI</a:t>
-            </a:r>
-            <a:endParaRPr lang="en-SG" sz="1600" dirty="0">
-              <a:solidFill>
-                <a:schemeClr val="bg1"/>
-              </a:solidFill>
-            </a:endParaRPr>
-          </a:p>
-        </p:txBody>
-      </p:sp>
       <p:cxnSp>
         <p:nvCxnSpPr>
-          <p:cNvPr id="46" name="Straight Connector 45"/>
+          <p:cNvPr id="85" name="Straight Connector 84"/>
           <p:cNvCxnSpPr/>
           <p:nvPr/>
         </p:nvCxnSpPr>
         <p:spPr>
-          <a:xfrm>
-            <a:off x="1268451" y="2649671"/>
-            <a:ext cx="0" cy="1723059"/>
+          <a:xfrm flipH="1">
+            <a:off x="314394" y="1099672"/>
+            <a:ext cx="24" cy="1598671"/>
           </a:xfrm>
           <a:prstGeom prst="line">
             <a:avLst/>
           </a:prstGeom>
           <a:ln w="19050">
             <a:solidFill>
-              <a:srgbClr val="00B050"/>
+              <a:schemeClr val="tx1"/>
             </a:solidFill>
             <a:prstDash val="sysDash"/>
           </a:ln>
@@ -5522,13 +5375,109 @@
       </p:cxnSp>
       <p:sp>
         <p:nvSpPr>
+          <p:cNvPr id="45" name="Rectangle 62"/>
+          <p:cNvSpPr/>
+          <p:nvPr/>
+        </p:nvSpPr>
+        <p:spPr>
+          <a:xfrm>
+            <a:off x="721634" y="4278322"/>
+            <a:ext cx="1093635" cy="346760"/>
+          </a:xfrm>
+          <a:prstGeom prst="rect">
+            <a:avLst/>
+          </a:prstGeom>
+          <a:solidFill>
+            <a:srgbClr val="00B050"/>
+          </a:solidFill>
+          <a:ln w="19050">
+            <a:solidFill>
+              <a:srgbClr val="00B050"/>
+            </a:solidFill>
+          </a:ln>
+          <a:effectLst/>
+        </p:spPr>
+        <p:style>
+          <a:lnRef idx="1">
+            <a:schemeClr val="accent2"/>
+          </a:lnRef>
+          <a:fillRef idx="2">
+            <a:schemeClr val="accent2"/>
+          </a:fillRef>
+          <a:effectRef idx="1">
+            <a:schemeClr val="accent2"/>
+          </a:effectRef>
+          <a:fontRef idx="minor">
+            <a:schemeClr val="dk1"/>
+          </a:fontRef>
+        </p:style>
+        <p:txBody>
+          <a:bodyPr rtlCol="0" anchor="ctr"/>
+          <a:lstStyle/>
+          <a:p>
+            <a:pPr algn="ctr"/>
+            <a:r>
+              <a:rPr lang="en-US" sz="1600" dirty="0" smtClean="0">
+                <a:solidFill>
+                  <a:schemeClr val="bg1"/>
+                </a:solidFill>
+              </a:rPr>
+              <a:t>:UI</a:t>
+            </a:r>
+            <a:endParaRPr lang="en-SG" sz="1600" dirty="0">
+              <a:solidFill>
+                <a:schemeClr val="bg1"/>
+              </a:solidFill>
+            </a:endParaRPr>
+          </a:p>
+        </p:txBody>
+      </p:sp>
+      <p:cxnSp>
+        <p:nvCxnSpPr>
+          <p:cNvPr id="46" name="Straight Connector 45"/>
+          <p:cNvCxnSpPr/>
+          <p:nvPr/>
+        </p:nvCxnSpPr>
+        <p:spPr>
+          <a:xfrm>
+            <a:off x="1268451" y="4641993"/>
+            <a:ext cx="0" cy="1723059"/>
+          </a:xfrm>
+          <a:prstGeom prst="line">
+            <a:avLst/>
+          </a:prstGeom>
+          <a:ln w="19050">
+            <a:solidFill>
+              <a:srgbClr val="00B050"/>
+            </a:solidFill>
+            <a:prstDash val="sysDash"/>
+          </a:ln>
+          <a:effectLst/>
+        </p:spPr>
+        <p:style>
+          <a:lnRef idx="1">
+            <a:schemeClr val="accent1"/>
+          </a:lnRef>
+          <a:fillRef idx="2">
+            <a:schemeClr val="accent1"/>
+          </a:fillRef>
+          <a:effectRef idx="1">
+            <a:schemeClr val="accent1"/>
+          </a:effectRef>
+          <a:fontRef idx="minor">
+            <a:schemeClr val="dk1"/>
+          </a:fontRef>
+        </p:style>
+      </p:cxnSp>
+      <p:sp>
+        <p:nvSpPr>
           <p:cNvPr id="47" name="Rectangle 46"/>
           <p:cNvSpPr/>
           <p:nvPr/>
         </p:nvSpPr>
         <p:spPr>
           <a:xfrm>
-            <a:off x="1196443" y="3678150"/>
+            <a:off x="1196443" y="5670472"/>
             <a:ext cx="130545" cy="273128"/>
           </a:xfrm>
           <a:prstGeom prst="rect">
@@ -5579,7 +5528,7 @@
         </p:nvCxnSpPr>
         <p:spPr>
           <a:xfrm flipH="1">
-            <a:off x="1348843" y="3951278"/>
+            <a:off x="1348843" y="5943600"/>
             <a:ext cx="3061842" cy="0"/>
           </a:xfrm>
           <a:prstGeom prst="straightConnector1">
@@ -5617,7 +5566,7 @@
         </p:nvCxnSpPr>
         <p:spPr>
           <a:xfrm>
-            <a:off x="1348843" y="3678150"/>
+            <a:off x="1348843" y="5670472"/>
             <a:ext cx="3061841" cy="0"/>
           </a:xfrm>
           <a:prstGeom prst="straightConnector1">
@@ -5656,7 +5605,7 @@
         </p:nvSpPr>
         <p:spPr>
           <a:xfrm>
-            <a:off x="1416276" y="3403047"/>
+            <a:off x="1416276" y="5395369"/>
             <a:ext cx="2659870" cy="215444"/>
           </a:xfrm>
           <a:prstGeom prst="rect">
@@ -5676,7 +5625,7 @@
                   <a:srgbClr val="00B050"/>
                 </a:solidFill>
               </a:rPr>
-              <a:t>handleTutorHelperChangedEvent</a:t>
+              <a:t>handleAddresssBookChangedEvent</a:t>
             </a:r>
             <a:r>
               <a:rPr lang="en-US" sz="1400" dirty="0" smtClean="0">
@@ -5702,7 +5651,7 @@
         </p:nvGrpSpPr>
         <p:grpSpPr>
           <a:xfrm>
-            <a:off x="1028134" y="3619710"/>
+            <a:off x="1028134" y="5612032"/>
             <a:ext cx="217349" cy="270072"/>
             <a:chOff x="1028134" y="5612032"/>
             <a:chExt cx="217349" cy="270072"/>
@@ -5861,7 +5810,7 @@
         </p:nvSpPr>
         <p:spPr>
           <a:xfrm>
-            <a:off x="194562" y="3452249"/>
+            <a:off x="194562" y="5444571"/>
             <a:ext cx="794081" cy="430887"/>
           </a:xfrm>
           <a:prstGeom prst="rect">
@@ -5900,7 +5849,7 @@
         </p:nvGrpSpPr>
         <p:grpSpPr>
           <a:xfrm flipH="1">
-            <a:off x="7936842" y="3343340"/>
+            <a:off x="7936842" y="5335662"/>
             <a:ext cx="217349" cy="270072"/>
             <a:chOff x="1028134" y="5612032"/>
             <a:chExt cx="217349" cy="270072"/>
@@ -6063,7 +6012,7 @@
         </p:nvSpPr>
         <p:spPr>
           <a:xfrm>
-            <a:off x="8223953" y="3188670"/>
+            <a:off x="8223953" y="5180992"/>
             <a:ext cx="539047" cy="430887"/>
           </a:xfrm>
           <a:prstGeom prst="rect">
@@ -6119,7 +6068,7 @@
     </p:spTree>
     <p:extLst>
       <p:ext uri="{BB962C8B-B14F-4D97-AF65-F5344CB8AC3E}">
-        <p14:creationId xmlns:p14="http://schemas.microsoft.com/office/powerpoint/2010/main" val="4294925931"/>
+        <p14:creationId xmlns:p14="http://schemas.microsoft.com/office/powerpoint/2010/main" val="4023378879"/>
       </p:ext>
     </p:extLst>
   </p:cSld>

</xml_diff>